<commit_message>
add images to pwpt
</commit_message>
<xml_diff>
--- a/DCP-presentation-group1.pptx
+++ b/DCP-presentation-group1.pptx
@@ -10,8 +10,10 @@
     <p:sldId id="258" r:id="rId7"/>
     <p:sldId id="259" r:id="rId8"/>
     <p:sldId id="260" r:id="rId9"/>
-    <p:sldId id="262" r:id="rId10"/>
-    <p:sldId id="261" r:id="rId11"/>
+    <p:sldId id="263" r:id="rId10"/>
+    <p:sldId id="264" r:id="rId11"/>
+    <p:sldId id="262" r:id="rId12"/>
+    <p:sldId id="261" r:id="rId13"/>
   </p:sldIdLst>
   <p:sldSz cx="12192000" cy="6858000"/>
   <p:notesSz cx="6858000" cy="9144000"/>
@@ -5747,7 +5749,7 @@
         </p:nvSpPr>
         <p:spPr>
           <a:xfrm>
-            <a:off x="2177472" y="2860190"/>
+            <a:off x="2177472" y="1631754"/>
             <a:ext cx="9144000" cy="1327172"/>
           </a:xfrm>
         </p:spPr>
@@ -5758,12 +5760,16 @@
           <a:lstStyle/>
           <a:p>
             <a:r>
-              <a:rPr lang="en-GB" dirty="0"/>
+              <a:rPr lang="en-GB" dirty="0" smtClean="0"/>
+              <a:t>Dear Mr/Mrs?</a:t>
+            </a:r>
+            <a:br>
+              <a:rPr lang="en-GB" dirty="0" smtClean="0"/>
+            </a:br>
+            <a:r>
+              <a:rPr lang="en-GB" dirty="0" smtClean="0"/>
               <a:t>Dear Dr/Revd?</a:t>
             </a:r>
-            <a:br>
-              <a:rPr lang="en-GB" dirty="0"/>
-            </a:br>
             <a:endParaRPr lang="en-GB" dirty="0"/>
           </a:p>
         </p:txBody>
@@ -5797,6 +5803,10 @@
             <a:br>
               <a:rPr lang="en-GB" sz="2800" dirty="0"/>
             </a:br>
+            <a:r>
+              <a:rPr lang="en-GB" sz="2800" dirty="0"/>
+              <a:t/>
+            </a:r>
             <a:br>
               <a:rPr lang="en-GB" sz="2800" dirty="0"/>
             </a:br>
@@ -5820,6 +5830,10 @@
               </a:rPr>
               <a:t> Aggarwal | Megan Briers | Tom Harris | Jason Wood</a:t>
             </a:r>
+            <a:r>
+              <a:rPr lang="en-GB" dirty="0"/>
+              <a:t/>
+            </a:r>
             <a:br>
               <a:rPr lang="en-GB" dirty="0"/>
             </a:br>
@@ -5827,85 +5841,30 @@
           </a:p>
         </p:txBody>
       </p:sp>
-      <p:sp>
-        <p:nvSpPr>
-          <p:cNvPr id="5" name="Title 1"/>
-          <p:cNvSpPr txBox="1">
-            <a:spLocks/>
-          </p:cNvSpPr>
+      <p:pic>
+        <p:nvPicPr>
+          <p:cNvPr id="4" name="Picture 3"/>
+          <p:cNvPicPr>
+            <a:picLocks noChangeAspect="1"/>
+          </p:cNvPicPr>
           <p:nvPr/>
-        </p:nvSpPr>
+        </p:nvPicPr>
+        <p:blipFill>
+          <a:blip r:embed="rId2"/>
+          <a:stretch>
+            <a:fillRect/>
+          </a:stretch>
+        </p:blipFill>
         <p:spPr>
           <a:xfrm>
-            <a:off x="2306781" y="1660792"/>
-            <a:ext cx="9144000" cy="1327172"/>
+            <a:off x="384463" y="1798857"/>
+            <a:ext cx="4095174" cy="2122665"/>
           </a:xfrm>
           <a:prstGeom prst="rect">
             <a:avLst/>
           </a:prstGeom>
         </p:spPr>
-        <p:txBody>
-          <a:bodyPr vert="horz" wrap="none" lIns="91440" tIns="45720" rIns="91440" bIns="45720" rtlCol="0" anchor="t">
-            <a:noAutofit/>
-          </a:bodyPr>
-          <a:lstStyle>
-            <a:lvl1pPr algn="r" defTabSz="914400" rtl="0" eaLnBrk="1" latinLnBrk="0" hangingPunct="1">
-              <a:lnSpc>
-                <a:spcPct val="90000"/>
-              </a:lnSpc>
-              <a:spcBef>
-                <a:spcPct val="0"/>
-              </a:spcBef>
-              <a:buNone/>
-              <a:defRPr sz="9600" b="0" kern="1200" spc="-300">
-                <a:gradFill flip="none" rotWithShape="1">
-                  <a:gsLst>
-                    <a:gs pos="32000">
-                      <a:schemeClr val="tx1">
-                        <a:lumMod val="89000"/>
-                      </a:schemeClr>
-                    </a:gs>
-                    <a:gs pos="0">
-                      <a:schemeClr val="bg1">
-                        <a:lumMod val="41000"/>
-                        <a:lumOff val="59000"/>
-                      </a:schemeClr>
-                    </a:gs>
-                    <a:gs pos="100000">
-                      <a:schemeClr val="tx2">
-                        <a:lumMod val="0"/>
-                        <a:lumOff val="100000"/>
-                      </a:schemeClr>
-                    </a:gs>
-                  </a:gsLst>
-                  <a:lin ang="8100000" scaled="1"/>
-                  <a:tileRect/>
-                </a:gradFill>
-                <a:effectLst>
-                  <a:outerShdw blurRad="469900" dist="342900" dir="5400000" sy="-20000" rotWithShape="0">
-                    <a:prstClr val="black">
-                      <a:alpha val="66000"/>
-                    </a:prstClr>
-                  </a:outerShdw>
-                </a:effectLst>
-                <a:latin typeface="+mj-lt"/>
-                <a:ea typeface="+mj-ea"/>
-                <a:cs typeface="+mj-cs"/>
-              </a:defRPr>
-            </a:lvl1pPr>
-          </a:lstStyle>
-          <a:p>
-            <a:r>
-              <a:rPr lang="en-GB" sz="8800" dirty="0"/>
-              <a:t>Dear Mr/Mrs?</a:t>
-            </a:r>
-            <a:br>
-              <a:rPr lang="en-GB" sz="8800" dirty="0"/>
-            </a:br>
-            <a:endParaRPr lang="en-GB" sz="8800" dirty="0"/>
-          </a:p>
-        </p:txBody>
-      </p:sp>
+      </p:pic>
     </p:spTree>
     <p:extLst>
       <p:ext uri="{BB962C8B-B14F-4D97-AF65-F5344CB8AC3E}">
@@ -5916,6 +5875,13 @@
   <p:clrMapOvr>
     <a:masterClrMapping/>
   </p:clrMapOvr>
+  <p:timing>
+    <p:tnLst>
+      <p:par>
+        <p:cTn id="1" dur="indefinite" restart="never" nodeType="tmRoot"/>
+      </p:par>
+    </p:tnLst>
+  </p:timing>
 </p:sld>
 </file>
 
@@ -6344,7 +6310,7 @@
         <p:spPr>
           <a:xfrm>
             <a:off x="1120000" y="1825625"/>
-            <a:ext cx="7238909" cy="4351338"/>
+            <a:ext cx="8014764" cy="4351338"/>
           </a:xfrm>
         </p:spPr>
         <p:txBody>
@@ -6401,7 +6367,7 @@
         </p:blipFill>
         <p:spPr>
           <a:xfrm>
-            <a:off x="210560" y="5742332"/>
+            <a:off x="219796" y="5742332"/>
             <a:ext cx="11584277" cy="569568"/>
           </a:xfrm>
           <a:prstGeom prst="rect">
@@ -6419,6 +6385,13 @@
   <p:clrMapOvr>
     <a:masterClrMapping/>
   </p:clrMapOvr>
+  <p:timing>
+    <p:tnLst>
+      <p:par>
+        <p:cTn id="1" dur="indefinite" restart="never" nodeType="tmRoot"/>
+      </p:par>
+    </p:tnLst>
+  </p:timing>
 </p:sld>
 </file>
 
@@ -6456,52 +6429,60 @@
           <a:p>
             <a:r>
               <a:rPr lang="en-GB" dirty="0"/>
-              <a:t>Conclusions</a:t>
-            </a:r>
-          </a:p>
-        </p:txBody>
-      </p:sp>
-      <p:sp>
-        <p:nvSpPr>
-          <p:cNvPr id="3" name="Content Placeholder 2"/>
-          <p:cNvSpPr>
-            <a:spLocks noGrp="1"/>
-          </p:cNvSpPr>
-          <p:nvPr>
-            <p:ph idx="1"/>
-          </p:nvPr>
-        </p:nvSpPr>
-        <p:spPr/>
-        <p:txBody>
-          <a:bodyPr/>
-          <a:lstStyle/>
-          <a:p>
-            <a:r>
-              <a:rPr lang="en-GB" dirty="0"/>
-              <a:t>Sex prediction can be done relatively accurately (without just assuming the correspondent is a man).</a:t>
-            </a:r>
-            <a:br>
-              <a:rPr lang="en-GB" dirty="0"/>
-            </a:br>
-            <a:endParaRPr lang="en-GB" dirty="0"/>
-          </a:p>
-          <a:p>
-            <a:r>
-              <a:rPr lang="en-GB" dirty="0"/>
-              <a:t>We provide a proof of concept for occupation inference. Though accuracy is limited, it could be taken further with a more thorough extraction of occupancy information from the data and with a more sophisticated language model.</a:t>
-            </a:r>
-          </a:p>
-          <a:p>
-            <a:endParaRPr lang="en-GB" dirty="0"/>
-          </a:p>
-          <a:p>
-            <a:r>
-              <a:rPr lang="en-GB" dirty="0"/>
-              <a:t>Our model could also be adapted for further investigative work, for example clustering the letters for </a:t>
-            </a:r>
-            <a:r>
-              <a:rPr lang="en-GB"/>
-              <a:t>topic analysis.</a:t>
+              <a:t>Occupation – Dear Dr/Revd</a:t>
+            </a:r>
+          </a:p>
+        </p:txBody>
+      </p:sp>
+      <p:pic>
+        <p:nvPicPr>
+          <p:cNvPr id="8" name="Picture 7"/>
+          <p:cNvPicPr>
+            <a:picLocks noChangeAspect="1"/>
+          </p:cNvPicPr>
+          <p:nvPr/>
+        </p:nvPicPr>
+        <p:blipFill>
+          <a:blip r:embed="rId2"/>
+          <a:stretch>
+            <a:fillRect/>
+          </a:stretch>
+        </p:blipFill>
+        <p:spPr>
+          <a:xfrm>
+            <a:off x="1009650" y="1534328"/>
+            <a:ext cx="8610600" cy="4843464"/>
+          </a:xfrm>
+          <a:prstGeom prst="rect">
+            <a:avLst/>
+          </a:prstGeom>
+        </p:spPr>
+      </p:pic>
+      <p:sp>
+        <p:nvSpPr>
+          <p:cNvPr id="10" name="TextBox 9"/>
+          <p:cNvSpPr txBox="1"/>
+          <p:nvPr/>
+        </p:nvSpPr>
+        <p:spPr>
+          <a:xfrm>
+            <a:off x="10001250" y="1690688"/>
+            <a:ext cx="1790700" cy="1200329"/>
+          </a:xfrm>
+          <a:prstGeom prst="rect">
+            <a:avLst/>
+          </a:prstGeom>
+          <a:noFill/>
+        </p:spPr>
+        <p:txBody>
+          <a:bodyPr wrap="square" rtlCol="0">
+            <a:spAutoFit/>
+          </a:bodyPr>
+          <a:lstStyle/>
+          <a:p>
+            <a:r>
+              <a:rPr lang="en-GB" dirty="0" smtClean="0"/>
+              <a:t>One of Darwin’s letters separated into individual words.</a:t>
             </a:r>
             <a:endParaRPr lang="en-GB" dirty="0"/>
           </a:p>
@@ -6510,13 +6491,20 @@
     </p:spTree>
     <p:extLst>
       <p:ext uri="{BB962C8B-B14F-4D97-AF65-F5344CB8AC3E}">
-        <p14:creationId xmlns:p14="http://schemas.microsoft.com/office/powerpoint/2010/main" val="1014809110"/>
+        <p14:creationId xmlns:p14="http://schemas.microsoft.com/office/powerpoint/2010/main" val="943226998"/>
       </p:ext>
     </p:extLst>
   </p:cSld>
   <p:clrMapOvr>
     <a:masterClrMapping/>
   </p:clrMapOvr>
+  <p:timing>
+    <p:tnLst>
+      <p:par>
+        <p:cTn id="1" dur="indefinite" restart="never" nodeType="tmRoot"/>
+      </p:par>
+    </p:tnLst>
+  </p:timing>
 </p:sld>
 </file>
 
@@ -6547,6 +6535,318 @@
             <p:ph type="title"/>
           </p:nvPr>
         </p:nvSpPr>
+        <p:spPr/>
+        <p:txBody>
+          <a:bodyPr/>
+          <a:lstStyle/>
+          <a:p>
+            <a:r>
+              <a:rPr lang="en-GB" dirty="0"/>
+              <a:t>Occupation – Dear Dr/Revd</a:t>
+            </a:r>
+          </a:p>
+        </p:txBody>
+      </p:sp>
+      <p:sp>
+        <p:nvSpPr>
+          <p:cNvPr id="10" name="TextBox 9"/>
+          <p:cNvSpPr txBox="1"/>
+          <p:nvPr/>
+        </p:nvSpPr>
+        <p:spPr>
+          <a:xfrm>
+            <a:off x="10001250" y="1690688"/>
+            <a:ext cx="1790700" cy="1200329"/>
+          </a:xfrm>
+          <a:prstGeom prst="rect">
+            <a:avLst/>
+          </a:prstGeom>
+          <a:noFill/>
+        </p:spPr>
+        <p:txBody>
+          <a:bodyPr wrap="square" rtlCol="0">
+            <a:spAutoFit/>
+          </a:bodyPr>
+          <a:lstStyle/>
+          <a:p>
+            <a:r>
+              <a:rPr lang="en-GB" dirty="0" smtClean="0"/>
+              <a:t>One of Darwin’s letters separated into individual words</a:t>
+            </a:r>
+            <a:endParaRPr lang="en-GB" dirty="0"/>
+          </a:p>
+        </p:txBody>
+      </p:sp>
+      <p:sp>
+        <p:nvSpPr>
+          <p:cNvPr id="5" name="TextBox 4"/>
+          <p:cNvSpPr txBox="1"/>
+          <p:nvPr/>
+        </p:nvSpPr>
+        <p:spPr>
+          <a:xfrm>
+            <a:off x="10001250" y="3252788"/>
+            <a:ext cx="1790700" cy="1754326"/>
+          </a:xfrm>
+          <a:prstGeom prst="rect">
+            <a:avLst/>
+          </a:prstGeom>
+          <a:noFill/>
+        </p:spPr>
+        <p:txBody>
+          <a:bodyPr wrap="square" rtlCol="0">
+            <a:spAutoFit/>
+          </a:bodyPr>
+          <a:lstStyle/>
+          <a:p>
+            <a:r>
+              <a:rPr lang="en-GB" dirty="0" smtClean="0"/>
+              <a:t/>
+            </a:r>
+            <a:br>
+              <a:rPr lang="en-GB" dirty="0" smtClean="0"/>
+            </a:br>
+            <a:r>
+              <a:rPr lang="en-GB" dirty="0" smtClean="0"/>
+              <a:t>and </a:t>
+            </a:r>
+            <a:r>
+              <a:rPr lang="en-GB" dirty="0" smtClean="0">
+                <a:solidFill>
+                  <a:srgbClr val="FF0000"/>
+                </a:solidFill>
+              </a:rPr>
+              <a:t>key words </a:t>
+            </a:r>
+            <a:r>
+              <a:rPr lang="en-GB" dirty="0" smtClean="0"/>
+              <a:t>selected by the occupation prediction model.</a:t>
+            </a:r>
+            <a:endParaRPr lang="en-GB" dirty="0"/>
+          </a:p>
+        </p:txBody>
+      </p:sp>
+      <p:sp>
+        <p:nvSpPr>
+          <p:cNvPr id="3" name="AutoShape 2" descr="cleaned.png"/>
+          <p:cNvSpPr>
+            <a:spLocks noChangeAspect="1" noChangeArrowheads="1"/>
+          </p:cNvSpPr>
+          <p:nvPr/>
+        </p:nvSpPr>
+        <p:spPr bwMode="auto">
+          <a:xfrm>
+            <a:off x="155575" y="-144463"/>
+            <a:ext cx="304800" cy="304801"/>
+          </a:xfrm>
+          <a:prstGeom prst="rect">
+            <a:avLst/>
+          </a:prstGeom>
+          <a:noFill/>
+          <a:extLst>
+            <a:ext uri="{909E8E84-426E-40DD-AFC4-6F175D3DCCD1}">
+              <a14:hiddenFill xmlns:a14="http://schemas.microsoft.com/office/drawing/2010/main">
+                <a:solidFill>
+                  <a:srgbClr val="FFFFFF"/>
+                </a:solidFill>
+              </a14:hiddenFill>
+            </a:ext>
+          </a:extLst>
+        </p:spPr>
+        <p:txBody>
+          <a:bodyPr vert="horz" wrap="square" lIns="91440" tIns="45720" rIns="91440" bIns="45720" numCol="1" anchor="t" anchorCtr="0" compatLnSpc="1">
+            <a:prstTxWarp prst="textNoShape">
+              <a:avLst/>
+            </a:prstTxWarp>
+          </a:bodyPr>
+          <a:lstStyle/>
+          <a:p>
+            <a:endParaRPr lang="en-GB"/>
+          </a:p>
+        </p:txBody>
+      </p:sp>
+      <p:pic>
+        <p:nvPicPr>
+          <p:cNvPr id="4" name="Picture 3"/>
+          <p:cNvPicPr>
+            <a:picLocks noChangeAspect="1"/>
+          </p:cNvPicPr>
+          <p:nvPr/>
+        </p:nvPicPr>
+        <p:blipFill>
+          <a:blip r:embed="rId2">
+            <a:extLst>
+              <a:ext uri="{28A0092B-C50C-407E-A947-70E740481C1C}">
+                <a14:useLocalDpi xmlns:a14="http://schemas.microsoft.com/office/drawing/2010/main" val="0"/>
+              </a:ext>
+            </a:extLst>
+          </a:blip>
+          <a:stretch>
+            <a:fillRect/>
+          </a:stretch>
+        </p:blipFill>
+        <p:spPr>
+          <a:xfrm>
+            <a:off x="952500" y="1524804"/>
+            <a:ext cx="8610600" cy="4843463"/>
+          </a:xfrm>
+          <a:prstGeom prst="rect">
+            <a:avLst/>
+          </a:prstGeom>
+        </p:spPr>
+      </p:pic>
+    </p:spTree>
+    <p:extLst>
+      <p:ext uri="{BB962C8B-B14F-4D97-AF65-F5344CB8AC3E}">
+        <p14:creationId xmlns:p14="http://schemas.microsoft.com/office/powerpoint/2010/main" val="27692593"/>
+      </p:ext>
+    </p:extLst>
+  </p:cSld>
+  <p:clrMapOvr>
+    <a:masterClrMapping/>
+  </p:clrMapOvr>
+  <p:timing>
+    <p:tnLst>
+      <p:par>
+        <p:cTn id="1" dur="indefinite" restart="never" nodeType="tmRoot"/>
+      </p:par>
+    </p:tnLst>
+  </p:timing>
+</p:sld>
+</file>
+
+<file path=ppt/slides/slide8.xml><?xml version="1.0" encoding="utf-8"?>
+<p:sld xmlns:a="http://schemas.openxmlformats.org/drawingml/2006/main" xmlns:r="http://schemas.openxmlformats.org/officeDocument/2006/relationships" xmlns:p="http://schemas.openxmlformats.org/presentationml/2006/main">
+  <p:cSld>
+    <p:spTree>
+      <p:nvGrpSpPr>
+        <p:cNvPr id="1" name=""/>
+        <p:cNvGrpSpPr/>
+        <p:nvPr/>
+      </p:nvGrpSpPr>
+      <p:grpSpPr>
+        <a:xfrm>
+          <a:off x="0" y="0"/>
+          <a:ext cx="0" cy="0"/>
+          <a:chOff x="0" y="0"/>
+          <a:chExt cx="0" cy="0"/>
+        </a:xfrm>
+      </p:grpSpPr>
+      <p:sp>
+        <p:nvSpPr>
+          <p:cNvPr id="2" name="Title 1"/>
+          <p:cNvSpPr>
+            <a:spLocks noGrp="1"/>
+          </p:cNvSpPr>
+          <p:nvPr>
+            <p:ph type="title"/>
+          </p:nvPr>
+        </p:nvSpPr>
+        <p:spPr/>
+        <p:txBody>
+          <a:bodyPr/>
+          <a:lstStyle/>
+          <a:p>
+            <a:r>
+              <a:rPr lang="en-GB" dirty="0"/>
+              <a:t>Conclusions</a:t>
+            </a:r>
+          </a:p>
+        </p:txBody>
+      </p:sp>
+      <p:sp>
+        <p:nvSpPr>
+          <p:cNvPr id="3" name="Content Placeholder 2"/>
+          <p:cNvSpPr>
+            <a:spLocks noGrp="1"/>
+          </p:cNvSpPr>
+          <p:nvPr>
+            <p:ph idx="1"/>
+          </p:nvPr>
+        </p:nvSpPr>
+        <p:spPr/>
+        <p:txBody>
+          <a:bodyPr/>
+          <a:lstStyle/>
+          <a:p>
+            <a:r>
+              <a:rPr lang="en-GB" dirty="0"/>
+              <a:t>Sex prediction can be done relatively accurately (without just assuming the correspondent is a man).</a:t>
+            </a:r>
+            <a:br>
+              <a:rPr lang="en-GB" dirty="0"/>
+            </a:br>
+            <a:endParaRPr lang="en-GB" dirty="0"/>
+          </a:p>
+          <a:p>
+            <a:r>
+              <a:rPr lang="en-GB" dirty="0"/>
+              <a:t>We provide a proof of concept for occupation inference. Though accuracy is limited, it could be taken further with a more thorough extraction of occupancy information from the data and with a more sophisticated language model.</a:t>
+            </a:r>
+          </a:p>
+          <a:p>
+            <a:endParaRPr lang="en-GB" dirty="0"/>
+          </a:p>
+          <a:p>
+            <a:r>
+              <a:rPr lang="en-GB" dirty="0"/>
+              <a:t>Our model could also be adapted for further investigative work, for example clustering the letters for </a:t>
+            </a:r>
+            <a:r>
+              <a:rPr lang="en-GB"/>
+              <a:t>topic analysis.</a:t>
+            </a:r>
+            <a:endParaRPr lang="en-GB" dirty="0"/>
+          </a:p>
+        </p:txBody>
+      </p:sp>
+    </p:spTree>
+    <p:extLst>
+      <p:ext uri="{BB962C8B-B14F-4D97-AF65-F5344CB8AC3E}">
+        <p14:creationId xmlns:p14="http://schemas.microsoft.com/office/powerpoint/2010/main" val="1014809110"/>
+      </p:ext>
+    </p:extLst>
+  </p:cSld>
+  <p:clrMapOvr>
+    <a:masterClrMapping/>
+  </p:clrMapOvr>
+  <p:timing>
+    <p:tnLst>
+      <p:par>
+        <p:cTn id="1" dur="indefinite" restart="never" nodeType="tmRoot"/>
+      </p:par>
+    </p:tnLst>
+  </p:timing>
+</p:sld>
+</file>
+
+<file path=ppt/slides/slide9.xml><?xml version="1.0" encoding="utf-8"?>
+<p:sld xmlns:a="http://schemas.openxmlformats.org/drawingml/2006/main" xmlns:r="http://schemas.openxmlformats.org/officeDocument/2006/relationships" xmlns:p="http://schemas.openxmlformats.org/presentationml/2006/main">
+  <p:cSld>
+    <p:spTree>
+      <p:nvGrpSpPr>
+        <p:cNvPr id="1" name=""/>
+        <p:cNvGrpSpPr/>
+        <p:nvPr/>
+      </p:nvGrpSpPr>
+      <p:grpSpPr>
+        <a:xfrm>
+          <a:off x="0" y="0"/>
+          <a:ext cx="0" cy="0"/>
+          <a:chOff x="0" y="0"/>
+          <a:chExt cx="0" cy="0"/>
+        </a:xfrm>
+      </p:grpSpPr>
+      <p:sp>
+        <p:nvSpPr>
+          <p:cNvPr id="2" name="Title 1"/>
+          <p:cNvSpPr>
+            <a:spLocks noGrp="1"/>
+          </p:cNvSpPr>
+          <p:nvPr>
+            <p:ph type="title"/>
+          </p:nvPr>
+        </p:nvSpPr>
         <p:spPr>
           <a:xfrm>
             <a:off x="3932381" y="2212398"/>
@@ -6576,6 +6876,13 @@
   <p:clrMapOvr>
     <a:masterClrMapping/>
   </p:clrMapOvr>
+  <p:timing>
+    <p:tnLst>
+      <p:par>
+        <p:cTn id="1" dur="indefinite" restart="never" nodeType="tmRoot"/>
+      </p:par>
+    </p:tnLst>
+  </p:timing>
 </p:sld>
 </file>
 
@@ -6841,6 +7148,21 @@
 </file>
 
 <file path=customXml/item1.xml><?xml version="1.0" encoding="utf-8"?>
+<?mso-contentType ?>
+<FormTemplates xmlns="http://schemas.microsoft.com/sharepoint/v3/contenttype/forms">
+  <Display>DocumentLibraryForm</Display>
+  <Edit>DocumentLibraryForm</Edit>
+  <New>DocumentLibraryForm</New>
+</FormTemplates>
+</file>
+
+<file path=customXml/item2.xml><?xml version="1.0" encoding="utf-8"?>
+<p:properties xmlns:p="http://schemas.microsoft.com/office/2006/metadata/properties" xmlns:xsi="http://www.w3.org/2001/XMLSchema-instance" xmlns:pc="http://schemas.microsoft.com/office/infopath/2007/PartnerControls">
+  <documentManagement/>
+</p:properties>
+</file>
+
+<file path=customXml/item3.xml><?xml version="1.0" encoding="utf-8"?>
 <ct:contentTypeSchema xmlns:ct="http://schemas.microsoft.com/office/2006/metadata/contentType" xmlns:ma="http://schemas.microsoft.com/office/2006/metadata/properties/metaAttributes" ct:_="" ma:_="" ma:contentTypeName="Document" ma:contentTypeID="0x01010048D2C9578948FB4BBDEFA4C115FF2CE8" ma:contentTypeVersion="14" ma:contentTypeDescription="Create a new document." ma:contentTypeScope="" ma:versionID="6e2fcab41b1b0198ed6f8326d7f010c7">
   <xsd:schema xmlns:xsd="http://www.w3.org/2001/XMLSchema" xmlns:xs="http://www.w3.org/2001/XMLSchema" xmlns:p="http://schemas.microsoft.com/office/2006/metadata/properties" xmlns:ns3="9911a6ce-f3f8-410c-82d6-cdebf25c0ba4" xmlns:ns4="43500f77-5812-4bb6-93cb-fabc4f5716a5" targetNamespace="http://schemas.microsoft.com/office/2006/metadata/properties" ma:root="true" ma:fieldsID="071ead392f8b4912e9cbb4dbb7078232" ns3:_="" ns4:_="">
     <xsd:import namespace="9911a6ce-f3f8-410c-82d6-cdebf25c0ba4"/>
@@ -7069,36 +7391,10 @@
 </ct:contentTypeSchema>
 </file>
 
-<file path=customXml/item2.xml><?xml version="1.0" encoding="utf-8"?>
-<p:properties xmlns:p="http://schemas.microsoft.com/office/2006/metadata/properties" xmlns:xsi="http://www.w3.org/2001/XMLSchema-instance" xmlns:pc="http://schemas.microsoft.com/office/infopath/2007/PartnerControls">
-  <documentManagement/>
-</p:properties>
-</file>
-
-<file path=customXml/item3.xml><?xml version="1.0" encoding="utf-8"?>
-<?mso-contentType ?>
-<FormTemplates xmlns="http://schemas.microsoft.com/sharepoint/v3/contenttype/forms">
-  <Display>DocumentLibraryForm</Display>
-  <Edit>DocumentLibraryForm</Edit>
-  <New>DocumentLibraryForm</New>
-</FormTemplates>
-</file>
-
 <file path=customXml/itemProps1.xml><?xml version="1.0" encoding="utf-8"?>
-<ds:datastoreItem xmlns:ds="http://schemas.openxmlformats.org/officeDocument/2006/customXml" ds:itemID="{F58F17D9-0F76-4381-9F89-4DAFD064F76C}">
+<ds:datastoreItem xmlns:ds="http://schemas.openxmlformats.org/officeDocument/2006/customXml" ds:itemID="{A7DA58CF-2062-49E8-B3B7-B6C28503C99D}">
   <ds:schemaRefs>
-    <ds:schemaRef ds:uri="http://schemas.microsoft.com/office/2006/metadata/contentType"/>
-    <ds:schemaRef ds:uri="http://schemas.microsoft.com/office/2006/metadata/properties/metaAttributes"/>
-    <ds:schemaRef ds:uri="http://www.w3.org/2001/XMLSchema"/>
-    <ds:schemaRef ds:uri="http://schemas.microsoft.com/office/2006/metadata/properties"/>
-    <ds:schemaRef ds:uri="9911a6ce-f3f8-410c-82d6-cdebf25c0ba4"/>
-    <ds:schemaRef ds:uri="43500f77-5812-4bb6-93cb-fabc4f5716a5"/>
-    <ds:schemaRef ds:uri="http://schemas.microsoft.com/office/2006/documentManagement/types"/>
-    <ds:schemaRef ds:uri="http://schemas.microsoft.com/office/infopath/2007/PartnerControls"/>
-    <ds:schemaRef ds:uri="http://schemas.openxmlformats.org/package/2006/metadata/core-properties"/>
-    <ds:schemaRef ds:uri="http://purl.org/dc/elements/1.1/"/>
-    <ds:schemaRef ds:uri="http://purl.org/dc/terms/"/>
-    <ds:schemaRef ds:uri="http://schemas.microsoft.com/internal/obd"/>
+    <ds:schemaRef ds:uri="http://schemas.microsoft.com/sharepoint/v3/contenttype/forms"/>
   </ds:schemaRefs>
 </ds:datastoreItem>
 </file>
@@ -7121,9 +7417,20 @@
 </file>
 
 <file path=customXml/itemProps3.xml><?xml version="1.0" encoding="utf-8"?>
-<ds:datastoreItem xmlns:ds="http://schemas.openxmlformats.org/officeDocument/2006/customXml" ds:itemID="{A7DA58CF-2062-49E8-B3B7-B6C28503C99D}">
+<ds:datastoreItem xmlns:ds="http://schemas.openxmlformats.org/officeDocument/2006/customXml" ds:itemID="{F58F17D9-0F76-4381-9F89-4DAFD064F76C}">
   <ds:schemaRefs>
-    <ds:schemaRef ds:uri="http://schemas.microsoft.com/sharepoint/v3/contenttype/forms"/>
+    <ds:schemaRef ds:uri="http://schemas.microsoft.com/office/2006/metadata/contentType"/>
+    <ds:schemaRef ds:uri="http://schemas.microsoft.com/office/2006/metadata/properties/metaAttributes"/>
+    <ds:schemaRef ds:uri="http://www.w3.org/2001/XMLSchema"/>
+    <ds:schemaRef ds:uri="http://schemas.microsoft.com/office/2006/metadata/properties"/>
+    <ds:schemaRef ds:uri="9911a6ce-f3f8-410c-82d6-cdebf25c0ba4"/>
+    <ds:schemaRef ds:uri="43500f77-5812-4bb6-93cb-fabc4f5716a5"/>
+    <ds:schemaRef ds:uri="http://schemas.microsoft.com/office/2006/documentManagement/types"/>
+    <ds:schemaRef ds:uri="http://schemas.microsoft.com/office/infopath/2007/PartnerControls"/>
+    <ds:schemaRef ds:uri="http://schemas.openxmlformats.org/package/2006/metadata/core-properties"/>
+    <ds:schemaRef ds:uri="http://purl.org/dc/elements/1.1/"/>
+    <ds:schemaRef ds:uri="http://purl.org/dc/terms/"/>
+    <ds:schemaRef ds:uri="http://schemas.microsoft.com/internal/obd"/>
   </ds:schemaRefs>
 </ds:datastoreItem>
 </file>
</xml_diff>

<commit_message>
presentation and bit more graphs
</commit_message>
<xml_diff>
--- a/DCP-presentation-group1.pptx
+++ b/DCP-presentation-group1.pptx
@@ -10,9 +10,10 @@
     <p:sldId id="258" r:id="rId7"/>
     <p:sldId id="259" r:id="rId8"/>
     <p:sldId id="260" r:id="rId9"/>
-    <p:sldId id="264" r:id="rId10"/>
-    <p:sldId id="262" r:id="rId11"/>
-    <p:sldId id="261" r:id="rId12"/>
+    <p:sldId id="265" r:id="rId10"/>
+    <p:sldId id="264" r:id="rId11"/>
+    <p:sldId id="262" r:id="rId12"/>
+    <p:sldId id="261" r:id="rId13"/>
   </p:sldIdLst>
   <p:sldSz cx="12192000" cy="6858000"/>
   <p:notesSz cx="6858000" cy="9144000"/>
@@ -6374,6 +6375,89 @@
 <file path=ppt/slides/slide6.xml><?xml version="1.0" encoding="utf-8"?>
 <p:sld xmlns:a="http://schemas.openxmlformats.org/drawingml/2006/main" xmlns:r="http://schemas.openxmlformats.org/officeDocument/2006/relationships" xmlns:p="http://schemas.openxmlformats.org/presentationml/2006/main">
   <p:cSld>
+    <p:bg>
+      <p:bgPr>
+        <a:blipFill dpi="0" rotWithShape="1">
+          <a:blip r:embed="rId2">
+            <a:lum/>
+          </a:blip>
+          <a:srcRect/>
+          <a:stretch>
+            <a:fillRect/>
+          </a:stretch>
+        </a:blipFill>
+        <a:effectLst/>
+      </p:bgPr>
+    </p:bg>
+    <p:spTree>
+      <p:nvGrpSpPr>
+        <p:cNvPr id="1" name=""/>
+        <p:cNvGrpSpPr/>
+        <p:nvPr/>
+      </p:nvGrpSpPr>
+      <p:grpSpPr>
+        <a:xfrm>
+          <a:off x="0" y="0"/>
+          <a:ext cx="0" cy="0"/>
+          <a:chOff x="0" y="0"/>
+          <a:chExt cx="0" cy="0"/>
+        </a:xfrm>
+      </p:grpSpPr>
+      <p:pic>
+        <p:nvPicPr>
+          <p:cNvPr id="5" name="Content Placeholder 4" descr="Chart, funnel chart&#10;&#10;Description automatically generated">
+            <a:extLst>
+              <a:ext uri="{FF2B5EF4-FFF2-40B4-BE49-F238E27FC236}">
+                <a16:creationId xmlns:a16="http://schemas.microsoft.com/office/drawing/2014/main" id="{3F3B684D-51D2-444C-9D29-9CACAA2B2DB7}"/>
+              </a:ext>
+            </a:extLst>
+          </p:cNvPr>
+          <p:cNvPicPr>
+            <a:picLocks noGrp="1" noChangeAspect="1"/>
+          </p:cNvPicPr>
+          <p:nvPr>
+            <p:ph idx="1"/>
+          </p:nvPr>
+        </p:nvPicPr>
+        <p:blipFill>
+          <a:blip r:embed="rId3"/>
+          <a:stretch>
+            <a:fillRect/>
+          </a:stretch>
+        </p:blipFill>
+        <p:spPr>
+          <a:xfrm>
+            <a:off x="1042869" y="1175873"/>
+            <a:ext cx="10126414" cy="4506254"/>
+          </a:xfrm>
+          <a:prstGeom prst="rect">
+            <a:avLst/>
+          </a:prstGeom>
+          <a:ln w="190500" cap="flat" cmpd="thinThick">
+            <a:solidFill>
+              <a:srgbClr val="FFFFFF"/>
+            </a:solidFill>
+            <a:prstDash val="solid"/>
+            <a:round/>
+          </a:ln>
+        </p:spPr>
+      </p:pic>
+    </p:spTree>
+    <p:extLst>
+      <p:ext uri="{BB962C8B-B14F-4D97-AF65-F5344CB8AC3E}">
+        <p14:creationId xmlns:p14="http://schemas.microsoft.com/office/powerpoint/2010/main" val="3426132979"/>
+      </p:ext>
+    </p:extLst>
+  </p:cSld>
+  <p:clrMapOvr>
+    <a:masterClrMapping/>
+  </p:clrMapOvr>
+</p:sld>
+</file>
+
+<file path=ppt/slides/slide7.xml><?xml version="1.0" encoding="utf-8"?>
+<p:sld xmlns:a="http://schemas.openxmlformats.org/drawingml/2006/main" xmlns:r="http://schemas.openxmlformats.org/officeDocument/2006/relationships" xmlns:p="http://schemas.openxmlformats.org/presentationml/2006/main">
+  <p:cSld>
     <p:spTree>
       <p:nvGrpSpPr>
         <p:cNvPr id="1" name=""/>
@@ -6651,7 +6735,7 @@
 </p:sld>
 </file>
 
-<file path=ppt/slides/slide7.xml><?xml version="1.0" encoding="utf-8"?>
+<file path=ppt/slides/slide8.xml><?xml version="1.0" encoding="utf-8"?>
 <p:sld xmlns:a="http://schemas.openxmlformats.org/drawingml/2006/main" xmlns:r="http://schemas.openxmlformats.org/officeDocument/2006/relationships" xmlns:p="http://schemas.openxmlformats.org/presentationml/2006/main">
   <p:cSld>
     <p:spTree>
@@ -6749,7 +6833,7 @@
 </p:sld>
 </file>
 
-<file path=ppt/slides/slide8.xml><?xml version="1.0" encoding="utf-8"?>
+<file path=ppt/slides/slide9.xml><?xml version="1.0" encoding="utf-8"?>
 <p:sld xmlns:a="http://schemas.openxmlformats.org/drawingml/2006/main" xmlns:r="http://schemas.openxmlformats.org/officeDocument/2006/relationships" xmlns:p="http://schemas.openxmlformats.org/presentationml/2006/main">
   <p:cSld>
     <p:spTree>
@@ -7076,15 +7160,6 @@
 </file>
 
 <file path=customXml/item2.xml><?xml version="1.0" encoding="utf-8"?>
-<?mso-contentType ?>
-<FormTemplates xmlns="http://schemas.microsoft.com/sharepoint/v3/contenttype/forms">
-  <Display>DocumentLibraryForm</Display>
-  <Edit>DocumentLibraryForm</Edit>
-  <New>DocumentLibraryForm</New>
-</FormTemplates>
-</file>
-
-<file path=customXml/item3.xml><?xml version="1.0" encoding="utf-8"?>
 <ct:contentTypeSchema xmlns:ct="http://schemas.microsoft.com/office/2006/metadata/contentType" xmlns:ma="http://schemas.microsoft.com/office/2006/metadata/properties/metaAttributes" ct:_="" ma:_="" ma:contentTypeName="Document" ma:contentTypeID="0x01010048D2C9578948FB4BBDEFA4C115FF2CE8" ma:contentTypeVersion="14" ma:contentTypeDescription="Create a new document." ma:contentTypeScope="" ma:versionID="6e2fcab41b1b0198ed6f8326d7f010c7">
   <xsd:schema xmlns:xsd="http://www.w3.org/2001/XMLSchema" xmlns:xs="http://www.w3.org/2001/XMLSchema" xmlns:p="http://schemas.microsoft.com/office/2006/metadata/properties" xmlns:ns3="9911a6ce-f3f8-410c-82d6-cdebf25c0ba4" xmlns:ns4="43500f77-5812-4bb6-93cb-fabc4f5716a5" targetNamespace="http://schemas.microsoft.com/office/2006/metadata/properties" ma:root="true" ma:fieldsID="071ead392f8b4912e9cbb4dbb7078232" ns3:_="" ns4:_="">
     <xsd:import namespace="9911a6ce-f3f8-410c-82d6-cdebf25c0ba4"/>
@@ -7313,6 +7388,15 @@
 </ct:contentTypeSchema>
 </file>
 
+<file path=customXml/item3.xml><?xml version="1.0" encoding="utf-8"?>
+<?mso-contentType ?>
+<FormTemplates xmlns="http://schemas.microsoft.com/sharepoint/v3/contenttype/forms">
+  <Display>DocumentLibraryForm</Display>
+  <Edit>DocumentLibraryForm</Edit>
+  <New>DocumentLibraryForm</New>
+</FormTemplates>
+</file>
+
 <file path=customXml/itemProps1.xml><?xml version="1.0" encoding="utf-8"?>
 <ds:datastoreItem xmlns:ds="http://schemas.openxmlformats.org/officeDocument/2006/customXml" ds:itemID="{5B20B516-085B-4FCA-81F9-E607D6E36C38}">
   <ds:schemaRefs>
@@ -7331,14 +7415,6 @@
 </file>
 
 <file path=customXml/itemProps2.xml><?xml version="1.0" encoding="utf-8"?>
-<ds:datastoreItem xmlns:ds="http://schemas.openxmlformats.org/officeDocument/2006/customXml" ds:itemID="{A7DA58CF-2062-49E8-B3B7-B6C28503C99D}">
-  <ds:schemaRefs>
-    <ds:schemaRef ds:uri="http://schemas.microsoft.com/sharepoint/v3/contenttype/forms"/>
-  </ds:schemaRefs>
-</ds:datastoreItem>
-</file>
-
-<file path=customXml/itemProps3.xml><?xml version="1.0" encoding="utf-8"?>
 <ds:datastoreItem xmlns:ds="http://schemas.openxmlformats.org/officeDocument/2006/customXml" ds:itemID="{F58F17D9-0F76-4381-9F89-4DAFD064F76C}">
   <ds:schemaRefs>
     <ds:schemaRef ds:uri="http://schemas.microsoft.com/office/2006/metadata/contentType"/>
@@ -7355,4 +7431,12 @@
     <ds:schemaRef ds:uri="http://schemas.microsoft.com/internal/obd"/>
   </ds:schemaRefs>
 </ds:datastoreItem>
+</file>
+
+<file path=customXml/itemProps3.xml><?xml version="1.0" encoding="utf-8"?>
+<ds:datastoreItem xmlns:ds="http://schemas.openxmlformats.org/officeDocument/2006/customXml" ds:itemID="{A7DA58CF-2062-49E8-B3B7-B6C28503C99D}">
+  <ds:schemaRefs>
+    <ds:schemaRef ds:uri="http://schemas.microsoft.com/sharepoint/v3/contenttype/forms"/>
+  </ds:schemaRefs>
+</ds:datastoreItem>
 </file>
</xml_diff>